<commit_message>
terza versione CBD spero definitiva
</commit_message>
<xml_diff>
--- a/Complementi_basi_di_dati/Progetto/Davide De Rosa - Presentazione CBD.pptx
+++ b/Complementi_basi_di_dati/Progetto/Davide De Rosa - Presentazione CBD.pptx
@@ -53,7 +53,6 @@
     <p:sldId id="298" r:id="rId47"/>
     <p:sldId id="299" r:id="rId48"/>
     <p:sldId id="300" r:id="rId49"/>
-    <p:sldId id="301" r:id="rId50"/>
   </p:sldIdLst>
   <p:sldSz cy="6858000" cx="9144000"/>
   <p:notesSz cx="6797675" cy="9926625"/>
@@ -5345,106 +5344,7 @@
       </p:grpSpPr>
       <p:sp>
         <p:nvSpPr>
-          <p:cNvPr id="336" name="Google Shape;336;g2d7838d52d4_0_302:notes"/>
-          <p:cNvSpPr txBox="1"/>
-          <p:nvPr>
-            <p:ph idx="1" type="body"/>
-          </p:nvPr>
-        </p:nvSpPr>
-        <p:spPr>
-          <a:xfrm>
-            <a:off x="681037" y="4714875"/>
-            <a:ext cx="5435700" cy="4467300"/>
-          </a:xfrm>
-          <a:prstGeom prst="rect">
-            <a:avLst/>
-          </a:prstGeom>
-        </p:spPr>
-        <p:txBody>
-          <a:bodyPr anchorCtr="0" anchor="ctr" bIns="91425" lIns="91425" spcFirstLastPara="1" rIns="91425" wrap="square" tIns="91425">
-            <a:noAutofit/>
-          </a:bodyPr>
-          <a:lstStyle/>
-          <a:p>
-            <a:pPr indent="0" lvl="0" marL="0" rtl="0" algn="l">
-              <a:spcBef>
-                <a:spcPts val="0"/>
-              </a:spcBef>
-              <a:spcAft>
-                <a:spcPts val="0"/>
-              </a:spcAft>
-              <a:buNone/>
-            </a:pPr>
-            <a:r>
-              <a:t/>
-            </a:r>
-            <a:endParaRPr/>
-          </a:p>
-        </p:txBody>
-      </p:sp>
-      <p:sp>
-        <p:nvSpPr>
-          <p:cNvPr id="337" name="Google Shape;337;g2d7838d52d4_0_302:notes"/>
-          <p:cNvSpPr/>
-          <p:nvPr>
-            <p:ph idx="2" type="sldImg"/>
-          </p:nvPr>
-        </p:nvSpPr>
-        <p:spPr>
-          <a:xfrm>
-            <a:off x="917575" y="744537"/>
-            <a:ext cx="4964100" cy="3722700"/>
-          </a:xfrm>
-          <a:custGeom>
-            <a:rect b="b" l="l" r="r" t="t"/>
-            <a:pathLst>
-              <a:path extrusionOk="0" h="120000" w="120000">
-                <a:moveTo>
-                  <a:pt x="0" y="0"/>
-                </a:moveTo>
-                <a:lnTo>
-                  <a:pt x="120000" y="0"/>
-                </a:lnTo>
-                <a:lnTo>
-                  <a:pt x="120000" y="120000"/>
-                </a:lnTo>
-                <a:lnTo>
-                  <a:pt x="0" y="120000"/>
-                </a:lnTo>
-                <a:close/>
-              </a:path>
-            </a:pathLst>
-          </a:custGeom>
-        </p:spPr>
-      </p:sp>
-    </p:spTree>
-  </p:cSld>
-  <p:clrMapOvr>
-    <a:masterClrMapping/>
-  </p:clrMapOvr>
-</p:notes>
-</file>
-
-<file path=ppt/notesSlides/notesSlide46.xml><?xml version="1.0" encoding="utf-8"?>
-<p:notes xmlns:a="http://schemas.openxmlformats.org/drawingml/2006/main" xmlns:r="http://schemas.openxmlformats.org/officeDocument/2006/relationships" xmlns:mc="http://schemas.openxmlformats.org/markup-compatibility/2006" xmlns:mv="urn:schemas-microsoft-com:mac:vml" xmlns:p="http://schemas.openxmlformats.org/presentationml/2006/main" xmlns:c="http://schemas.openxmlformats.org/drawingml/2006/chart" xmlns:dgm="http://schemas.openxmlformats.org/drawingml/2006/diagram" xmlns:o="urn:schemas-microsoft-com:office:office" xmlns:v="urn:schemas-microsoft-com:vml" xmlns:pvml="urn:schemas-microsoft-com:office:powerpoint" xmlns:com="http://schemas.openxmlformats.org/drawingml/2006/compatibility" xmlns:p14="http://schemas.microsoft.com/office/powerpoint/2010/main" xmlns:p15="http://schemas.microsoft.com/office/powerpoint/2012/main" xmlns:ahyp="http://schemas.microsoft.com/office/drawing/2018/hyperlinkcolor" showMasterPhAnim="0" showMasterSp="0">
-  <p:cSld>
-    <p:spTree>
-      <p:nvGrpSpPr>
-        <p:cNvPr id="341" name="Shape 341"/>
-        <p:cNvGrpSpPr/>
-        <p:nvPr/>
-      </p:nvGrpSpPr>
-      <p:grpSpPr>
-        <a:xfrm>
-          <a:off x="0" y="0"/>
-          <a:ext cx="0" cy="0"/>
-          <a:chOff x="0" y="0"/>
-          <a:chExt cx="0" cy="0"/>
-        </a:xfrm>
-      </p:grpSpPr>
-      <p:sp>
-        <p:nvSpPr>
-          <p:cNvPr id="342" name="Google Shape;342;p8:notes"/>
+          <p:cNvPr id="336" name="Google Shape;336;p8:notes"/>
           <p:cNvSpPr txBox="1"/>
           <p:nvPr>
             <p:ph idx="1" type="body"/>
@@ -5483,7 +5383,7 @@
       </p:sp>
       <p:sp>
         <p:nvSpPr>
-          <p:cNvPr id="343" name="Google Shape;343;p8:notes"/>
+          <p:cNvPr id="337" name="Google Shape;337;p8:notes"/>
           <p:cNvSpPr/>
           <p:nvPr>
             <p:ph idx="2" type="sldImg"/>
@@ -19856,7 +19756,7 @@
                   <a:schemeClr val="dk1"/>
                 </a:solidFill>
               </a:rPr>
-              <a:t>only 3 vendors</a:t>
+              <a:t>only 4 vendors</a:t>
             </a:r>
             <a:r>
               <a:rPr lang="en-US" sz="1800">
@@ -23190,7 +23090,10 @@
           </a:bodyPr>
           <a:lstStyle/>
           <a:p>
-            <a:pPr indent="0" lvl="0" marL="0" rtl="0" algn="ctr">
+            <a:pPr indent="0" lvl="0" marL="0" marR="0" rtl="0" algn="ctr">
+              <a:lnSpc>
+                <a:spcPct val="100000"/>
+              </a:lnSpc>
               <a:spcBef>
                 <a:spcPts val="0"/>
               </a:spcBef>
@@ -23198,18 +23101,22 @@
                 <a:spcPts val="0"/>
               </a:spcAft>
               <a:buClr>
-                <a:schemeClr val="dk1"/>
+                <a:schemeClr val="dk2"/>
               </a:buClr>
               <a:buFont typeface="Arial"/>
               <a:buNone/>
             </a:pPr>
             <a:r>
-              <a:rPr lang="en-US">
-                <a:solidFill>
-                  <a:schemeClr val="dk1"/>
-                </a:solidFill>
-              </a:rPr>
-              <a:t>Conclusions</a:t>
+              <a:rPr b="0" i="0" lang="en-US" sz="4000" u="none" cap="none" strike="noStrike">
+                <a:solidFill>
+                  <a:schemeClr val="dk2"/>
+                </a:solidFill>
+                <a:latin typeface="Arial"/>
+                <a:ea typeface="Arial"/>
+                <a:cs typeface="Arial"/>
+                <a:sym typeface="Arial"/>
+              </a:rPr>
+              <a:t>References</a:t>
             </a:r>
             <a:endParaRPr/>
           </a:p>
@@ -23218,372 +23125,6 @@
       <p:sp>
         <p:nvSpPr>
           <p:cNvPr id="340" name="Google Shape;340;p52"/>
-          <p:cNvSpPr txBox="1"/>
-          <p:nvPr>
-            <p:ph idx="1" type="body"/>
-          </p:nvPr>
-        </p:nvSpPr>
-        <p:spPr>
-          <a:xfrm>
-            <a:off x="457200" y="904875"/>
-            <a:ext cx="8229600" cy="5145000"/>
-          </a:xfrm>
-          <a:prstGeom prst="rect">
-            <a:avLst/>
-          </a:prstGeom>
-          <a:noFill/>
-          <a:ln>
-            <a:noFill/>
-          </a:ln>
-        </p:spPr>
-        <p:txBody>
-          <a:bodyPr anchorCtr="0" anchor="t" bIns="45700" lIns="91425" spcFirstLastPara="1" rIns="91425" wrap="square" tIns="45700">
-            <a:noAutofit/>
-          </a:bodyPr>
-          <a:lstStyle/>
-          <a:p>
-            <a:pPr indent="0" lvl="0" marL="0" marR="0" rtl="0" algn="l">
-              <a:lnSpc>
-                <a:spcPct val="115000"/>
-              </a:lnSpc>
-              <a:spcBef>
-                <a:spcPts val="0"/>
-              </a:spcBef>
-              <a:spcAft>
-                <a:spcPts val="0"/>
-              </a:spcAft>
-              <a:buNone/>
-            </a:pPr>
-            <a:r>
-              <a:rPr lang="en-US" sz="2000">
-                <a:solidFill>
-                  <a:schemeClr val="dk1"/>
-                </a:solidFill>
-              </a:rPr>
-              <a:t>In addition to this shift, the concept of </a:t>
-            </a:r>
-            <a:r>
-              <a:rPr b="1" lang="en-US" sz="2000">
-                <a:solidFill>
-                  <a:schemeClr val="dk1"/>
-                </a:solidFill>
-              </a:rPr>
-              <a:t>data commoditization</a:t>
-            </a:r>
-            <a:r>
-              <a:rPr lang="en-US" sz="2000">
-                <a:solidFill>
-                  <a:schemeClr val="dk1"/>
-                </a:solidFill>
-              </a:rPr>
-              <a:t> comes into play, especially when considering the two groups of data consumers: those seeking </a:t>
-            </a:r>
-            <a:r>
-              <a:rPr b="1" lang="en-US" sz="2000">
-                <a:solidFill>
-                  <a:schemeClr val="dk1"/>
-                </a:solidFill>
-              </a:rPr>
-              <a:t>highly specific</a:t>
-            </a:r>
-            <a:r>
-              <a:rPr lang="en-US" sz="2000">
-                <a:solidFill>
-                  <a:schemeClr val="dk1"/>
-                </a:solidFill>
-              </a:rPr>
-              <a:t>, </a:t>
-            </a:r>
-            <a:r>
-              <a:rPr b="1" lang="en-US" sz="2000">
-                <a:solidFill>
-                  <a:schemeClr val="dk1"/>
-                </a:solidFill>
-              </a:rPr>
-              <a:t>individualized</a:t>
-            </a:r>
-            <a:r>
-              <a:rPr lang="en-US" sz="2000">
-                <a:solidFill>
-                  <a:schemeClr val="dk1"/>
-                </a:solidFill>
-              </a:rPr>
-              <a:t> </a:t>
-            </a:r>
-            <a:r>
-              <a:rPr b="1" lang="en-US" sz="2000">
-                <a:solidFill>
-                  <a:schemeClr val="dk1"/>
-                </a:solidFill>
-              </a:rPr>
-              <a:t>data</a:t>
-            </a:r>
-            <a:r>
-              <a:rPr lang="en-US" sz="2000">
-                <a:solidFill>
-                  <a:schemeClr val="dk1"/>
-                </a:solidFill>
-              </a:rPr>
-              <a:t>, and those requiring </a:t>
-            </a:r>
-            <a:r>
-              <a:rPr b="1" lang="en-US" sz="2000">
-                <a:solidFill>
-                  <a:schemeClr val="dk1"/>
-                </a:solidFill>
-              </a:rPr>
-              <a:t>data of consistent quality</a:t>
-            </a:r>
-            <a:r>
-              <a:rPr lang="en-US" sz="2000">
-                <a:solidFill>
-                  <a:schemeClr val="dk1"/>
-                </a:solidFill>
-              </a:rPr>
-              <a:t>. </a:t>
-            </a:r>
-            <a:endParaRPr sz="2000">
-              <a:solidFill>
-                <a:schemeClr val="dk1"/>
-              </a:solidFill>
-            </a:endParaRPr>
-          </a:p>
-          <a:p>
-            <a:pPr indent="0" lvl="0" marL="0" marR="0" rtl="0" algn="l">
-              <a:lnSpc>
-                <a:spcPct val="115000"/>
-              </a:lnSpc>
-              <a:spcBef>
-                <a:spcPts val="0"/>
-              </a:spcBef>
-              <a:spcAft>
-                <a:spcPts val="0"/>
-              </a:spcAft>
-              <a:buNone/>
-            </a:pPr>
-            <a:r>
-              <a:t/>
-            </a:r>
-            <a:endParaRPr sz="2000">
-              <a:solidFill>
-                <a:schemeClr val="dk1"/>
-              </a:solidFill>
-            </a:endParaRPr>
-          </a:p>
-          <a:p>
-            <a:pPr indent="0" lvl="0" marL="0" marR="0" rtl="0" algn="l">
-              <a:lnSpc>
-                <a:spcPct val="115000"/>
-              </a:lnSpc>
-              <a:spcBef>
-                <a:spcPts val="0"/>
-              </a:spcBef>
-              <a:spcAft>
-                <a:spcPts val="0"/>
-              </a:spcAft>
-              <a:buNone/>
-            </a:pPr>
-            <a:r>
-              <a:rPr lang="en-US" sz="2000">
-                <a:solidFill>
-                  <a:schemeClr val="dk1"/>
-                </a:solidFill>
-              </a:rPr>
-              <a:t>For the former group, commoditization may not be desirable, as highly specialized data is unlikely to follow a standardization path. </a:t>
-            </a:r>
-            <a:endParaRPr sz="2000">
-              <a:solidFill>
-                <a:schemeClr val="dk1"/>
-              </a:solidFill>
-            </a:endParaRPr>
-          </a:p>
-          <a:p>
-            <a:pPr indent="0" lvl="0" marL="0" marR="0" rtl="0" algn="l">
-              <a:lnSpc>
-                <a:spcPct val="115000"/>
-              </a:lnSpc>
-              <a:spcBef>
-                <a:spcPts val="0"/>
-              </a:spcBef>
-              <a:spcAft>
-                <a:spcPts val="0"/>
-              </a:spcAft>
-              <a:buNone/>
-            </a:pPr>
-            <a:r>
-              <a:t/>
-            </a:r>
-            <a:endParaRPr sz="2000">
-              <a:solidFill>
-                <a:schemeClr val="dk1"/>
-              </a:solidFill>
-            </a:endParaRPr>
-          </a:p>
-          <a:p>
-            <a:pPr indent="0" lvl="0" marL="0" marR="0" rtl="0" algn="l">
-              <a:lnSpc>
-                <a:spcPct val="115000"/>
-              </a:lnSpc>
-              <a:spcBef>
-                <a:spcPts val="0"/>
-              </a:spcBef>
-              <a:spcAft>
-                <a:spcPts val="0"/>
-              </a:spcAft>
-              <a:buNone/>
-            </a:pPr>
-            <a:r>
-              <a:rPr lang="en-US" sz="2000">
-                <a:solidFill>
-                  <a:schemeClr val="dk1"/>
-                </a:solidFill>
-              </a:rPr>
-              <a:t>On the other hand, for the latter group, data that is more standardized and consistent would be more conducive to commoditization, likely increasing its exchange on marketplaces. </a:t>
-            </a:r>
-            <a:endParaRPr sz="2000">
-              <a:solidFill>
-                <a:schemeClr val="dk1"/>
-              </a:solidFill>
-            </a:endParaRPr>
-          </a:p>
-          <a:p>
-            <a:pPr indent="0" lvl="0" marL="0" marR="0" rtl="0" algn="l">
-              <a:lnSpc>
-                <a:spcPct val="115000"/>
-              </a:lnSpc>
-              <a:spcBef>
-                <a:spcPts val="0"/>
-              </a:spcBef>
-              <a:spcAft>
-                <a:spcPts val="0"/>
-              </a:spcAft>
-              <a:buNone/>
-            </a:pPr>
-            <a:r>
-              <a:t/>
-            </a:r>
-            <a:endParaRPr sz="2000">
-              <a:solidFill>
-                <a:schemeClr val="dk1"/>
-              </a:solidFill>
-            </a:endParaRPr>
-          </a:p>
-          <a:p>
-            <a:pPr indent="0" lvl="0" marL="0" marR="0" rtl="0" algn="l">
-              <a:lnSpc>
-                <a:spcPct val="115000"/>
-              </a:lnSpc>
-              <a:spcBef>
-                <a:spcPts val="0"/>
-              </a:spcBef>
-              <a:spcAft>
-                <a:spcPts val="0"/>
-              </a:spcAft>
-              <a:buNone/>
-            </a:pPr>
-            <a:r>
-              <a:rPr lang="en-US" sz="2000">
-                <a:solidFill>
-                  <a:schemeClr val="dk1"/>
-                </a:solidFill>
-              </a:rPr>
-              <a:t>This could lead to a more competitive market for standardized data, further driving down implementation costs and increasing accessibility.</a:t>
-            </a:r>
-            <a:endParaRPr sz="2000">
-              <a:solidFill>
-                <a:schemeClr val="dk1"/>
-              </a:solidFill>
-            </a:endParaRPr>
-          </a:p>
-        </p:txBody>
-      </p:sp>
-    </p:spTree>
-  </p:cSld>
-  <p:clrMapOvr>
-    <a:masterClrMapping/>
-  </p:clrMapOvr>
-</p:sld>
-</file>
-
-<file path=ppt/slides/slide46.xml><?xml version="1.0" encoding="utf-8"?>
-<p:sld xmlns:a="http://schemas.openxmlformats.org/drawingml/2006/main" xmlns:r="http://schemas.openxmlformats.org/officeDocument/2006/relationships" xmlns:mc="http://schemas.openxmlformats.org/markup-compatibility/2006" xmlns:mv="urn:schemas-microsoft-com:mac:vml" xmlns:p="http://schemas.openxmlformats.org/presentationml/2006/main" xmlns:c="http://schemas.openxmlformats.org/drawingml/2006/chart" xmlns:dgm="http://schemas.openxmlformats.org/drawingml/2006/diagram" xmlns:o="urn:schemas-microsoft-com:office:office" xmlns:v="urn:schemas-microsoft-com:vml" xmlns:pvml="urn:schemas-microsoft-com:office:powerpoint" xmlns:com="http://schemas.openxmlformats.org/drawingml/2006/compatibility" xmlns:p14="http://schemas.microsoft.com/office/powerpoint/2010/main" xmlns:p15="http://schemas.microsoft.com/office/powerpoint/2012/main" xmlns:ahyp="http://schemas.microsoft.com/office/drawing/2018/hyperlinkcolor">
-  <p:cSld>
-    <p:spTree>
-      <p:nvGrpSpPr>
-        <p:cNvPr id="344" name="Shape 344"/>
-        <p:cNvGrpSpPr/>
-        <p:nvPr/>
-      </p:nvGrpSpPr>
-      <p:grpSpPr>
-        <a:xfrm>
-          <a:off x="0" y="0"/>
-          <a:ext cx="0" cy="0"/>
-          <a:chOff x="0" y="0"/>
-          <a:chExt cx="0" cy="0"/>
-        </a:xfrm>
-      </p:grpSpPr>
-      <p:sp>
-        <p:nvSpPr>
-          <p:cNvPr id="345" name="Google Shape;345;p53"/>
-          <p:cNvSpPr txBox="1"/>
-          <p:nvPr>
-            <p:ph type="title"/>
-          </p:nvPr>
-        </p:nvSpPr>
-        <p:spPr>
-          <a:xfrm>
-            <a:off x="457200" y="44450"/>
-            <a:ext cx="8229600" cy="647700"/>
-          </a:xfrm>
-          <a:prstGeom prst="rect">
-            <a:avLst/>
-          </a:prstGeom>
-          <a:noFill/>
-          <a:ln>
-            <a:noFill/>
-          </a:ln>
-        </p:spPr>
-        <p:txBody>
-          <a:bodyPr anchorCtr="0" anchor="t" bIns="45700" lIns="91425" spcFirstLastPara="1" rIns="91425" wrap="square" tIns="45700">
-            <a:noAutofit/>
-          </a:bodyPr>
-          <a:lstStyle/>
-          <a:p>
-            <a:pPr indent="0" lvl="0" marL="0" marR="0" rtl="0" algn="ctr">
-              <a:lnSpc>
-                <a:spcPct val="100000"/>
-              </a:lnSpc>
-              <a:spcBef>
-                <a:spcPts val="0"/>
-              </a:spcBef>
-              <a:spcAft>
-                <a:spcPts val="0"/>
-              </a:spcAft>
-              <a:buClr>
-                <a:schemeClr val="dk2"/>
-              </a:buClr>
-              <a:buFont typeface="Arial"/>
-              <a:buNone/>
-            </a:pPr>
-            <a:r>
-              <a:rPr b="0" i="0" lang="en-US" sz="4000" u="none" cap="none" strike="noStrike">
-                <a:solidFill>
-                  <a:schemeClr val="dk2"/>
-                </a:solidFill>
-                <a:latin typeface="Arial"/>
-                <a:ea typeface="Arial"/>
-                <a:cs typeface="Arial"/>
-                <a:sym typeface="Arial"/>
-              </a:rPr>
-              <a:t>References</a:t>
-            </a:r>
-            <a:endParaRPr/>
-          </a:p>
-        </p:txBody>
-      </p:sp>
-      <p:sp>
-        <p:nvSpPr>
-          <p:cNvPr id="346" name="Google Shape;346;p53"/>
           <p:cNvSpPr txBox="1"/>
           <p:nvPr>
             <p:ph idx="1" type="body"/>
@@ -25455,6 +24996,285 @@
 </file>
 
 <file path=ppt/theme/theme1.xml><?xml version="1.0" encoding="utf-8"?>
+<a:theme xmlns:a="http://schemas.openxmlformats.org/drawingml/2006/main" xmlns:r="http://schemas.openxmlformats.org/officeDocument/2006/relationships" name="2_Personalizza struttura">
+  <a:themeElements>
+    <a:clrScheme name="2_Personalizza struttura 1">
+      <a:dk1>
+        <a:srgbClr val="000000"/>
+      </a:dk1>
+      <a:lt1>
+        <a:srgbClr val="FFFFFF"/>
+      </a:lt1>
+      <a:dk2>
+        <a:srgbClr val="000000"/>
+      </a:dk2>
+      <a:lt2>
+        <a:srgbClr val="808080"/>
+      </a:lt2>
+      <a:accent1>
+        <a:srgbClr val="BBE0E3"/>
+      </a:accent1>
+      <a:accent2>
+        <a:srgbClr val="333399"/>
+      </a:accent2>
+      <a:accent3>
+        <a:srgbClr val="FFFFFF"/>
+      </a:accent3>
+      <a:accent4>
+        <a:srgbClr val="000000"/>
+      </a:accent4>
+      <a:accent5>
+        <a:srgbClr val="DAEDEF"/>
+      </a:accent5>
+      <a:accent6>
+        <a:srgbClr val="2D2D8A"/>
+      </a:accent6>
+      <a:hlink>
+        <a:srgbClr val="009999"/>
+      </a:hlink>
+      <a:folHlink>
+        <a:srgbClr val="99CC00"/>
+      </a:folHlink>
+    </a:clrScheme>
+    <a:fontScheme name="Office">
+      <a:majorFont>
+        <a:latin typeface="Arial"/>
+        <a:ea typeface=""/>
+        <a:cs typeface=""/>
+        <a:font script="Jpan" typeface="ＭＳ Ｐゴシック"/>
+        <a:font script="Hang" typeface="맑은 고딕"/>
+        <a:font script="Hans" typeface="宋体"/>
+        <a:font script="Hant" typeface="新細明體"/>
+        <a:font script="Arab" typeface="Times New Roman"/>
+        <a:font script="Hebr" typeface="Times New Roman"/>
+        <a:font script="Thai" typeface="Angsana New"/>
+        <a:font script="Ethi" typeface="Nyala"/>
+        <a:font script="Beng" typeface="Vrinda"/>
+        <a:font script="Gujr" typeface="Shruti"/>
+        <a:font script="Khmr" typeface="MoolBoran"/>
+        <a:font script="Knda" typeface="Tunga"/>
+        <a:font script="Guru" typeface="Raavi"/>
+        <a:font script="Cans" typeface="Euphemia"/>
+        <a:font script="Cher" typeface="Plantagenet Cherokee"/>
+        <a:font script="Yiii" typeface="Microsoft Yi Baiti"/>
+        <a:font script="Tibt" typeface="Microsoft Himalaya"/>
+        <a:font script="Thaa" typeface="MV Boli"/>
+        <a:font script="Deva" typeface="Mangal"/>
+        <a:font script="Telu" typeface="Gautami"/>
+        <a:font script="Taml" typeface="Latha"/>
+        <a:font script="Syrc" typeface="Estrangelo Edessa"/>
+        <a:font script="Orya" typeface="Kalinga"/>
+        <a:font script="Mlym" typeface="Kartika"/>
+        <a:font script="Laoo" typeface="DokChampa"/>
+        <a:font script="Sinh" typeface="Iskoola Pota"/>
+        <a:font script="Mong" typeface="Mongolian Baiti"/>
+        <a:font script="Viet" typeface="Times New Roman"/>
+        <a:font script="Uigh" typeface="Microsoft Uighur"/>
+        <a:font script="Geor" typeface="Sylfaen"/>
+      </a:majorFont>
+      <a:minorFont>
+        <a:latin typeface="Arial"/>
+        <a:ea typeface=""/>
+        <a:cs typeface=""/>
+        <a:font script="Jpan" typeface="ＭＳ Ｐゴシック"/>
+        <a:font script="Hang" typeface="맑은 고딕"/>
+        <a:font script="Hans" typeface="宋体"/>
+        <a:font script="Hant" typeface="新細明體"/>
+        <a:font script="Arab" typeface="Arial"/>
+        <a:font script="Hebr" typeface="Arial"/>
+        <a:font script="Thai" typeface="Cordia New"/>
+        <a:font script="Ethi" typeface="Nyala"/>
+        <a:font script="Beng" typeface="Vrinda"/>
+        <a:font script="Gujr" typeface="Shruti"/>
+        <a:font script="Khmr" typeface="DaunPenh"/>
+        <a:font script="Knda" typeface="Tunga"/>
+        <a:font script="Guru" typeface="Raavi"/>
+        <a:font script="Cans" typeface="Euphemia"/>
+        <a:font script="Cher" typeface="Plantagenet Cherokee"/>
+        <a:font script="Yiii" typeface="Microsoft Yi Baiti"/>
+        <a:font script="Tibt" typeface="Microsoft Himalaya"/>
+        <a:font script="Thaa" typeface="MV Boli"/>
+        <a:font script="Deva" typeface="Mangal"/>
+        <a:font script="Telu" typeface="Gautami"/>
+        <a:font script="Taml" typeface="Latha"/>
+        <a:font script="Syrc" typeface="Estrangelo Edessa"/>
+        <a:font script="Orya" typeface="Kalinga"/>
+        <a:font script="Mlym" typeface="Kartika"/>
+        <a:font script="Laoo" typeface="DokChampa"/>
+        <a:font script="Sinh" typeface="Iskoola Pota"/>
+        <a:font script="Mong" typeface="Mongolian Baiti"/>
+        <a:font script="Viet" typeface="Arial"/>
+        <a:font script="Uigh" typeface="Microsoft Uighur"/>
+        <a:font script="Geor" typeface="Sylfaen"/>
+      </a:minorFont>
+    </a:fontScheme>
+    <a:fmtScheme name="Office">
+      <a:fillStyleLst>
+        <a:solidFill>
+          <a:schemeClr val="phClr"/>
+        </a:solidFill>
+        <a:gradFill rotWithShape="1">
+          <a:gsLst>
+            <a:gs pos="0">
+              <a:schemeClr val="phClr">
+                <a:tint val="50000"/>
+                <a:satMod val="300000"/>
+              </a:schemeClr>
+            </a:gs>
+            <a:gs pos="35000">
+              <a:schemeClr val="phClr">
+                <a:tint val="37000"/>
+                <a:satMod val="300000"/>
+              </a:schemeClr>
+            </a:gs>
+            <a:gs pos="100000">
+              <a:schemeClr val="phClr">
+                <a:tint val="15000"/>
+                <a:satMod val="350000"/>
+              </a:schemeClr>
+            </a:gs>
+          </a:gsLst>
+          <a:lin ang="16200000" scaled="1"/>
+        </a:gradFill>
+        <a:gradFill rotWithShape="1">
+          <a:gsLst>
+            <a:gs pos="0">
+              <a:schemeClr val="phClr">
+                <a:tint val="100000"/>
+                <a:shade val="100000"/>
+                <a:satMod val="130000"/>
+              </a:schemeClr>
+            </a:gs>
+            <a:gs pos="100000">
+              <a:schemeClr val="phClr">
+                <a:tint val="50000"/>
+                <a:shade val="100000"/>
+                <a:satMod val="350000"/>
+              </a:schemeClr>
+            </a:gs>
+          </a:gsLst>
+          <a:lin ang="16200000" scaled="0"/>
+        </a:gradFill>
+      </a:fillStyleLst>
+      <a:lnStyleLst>
+        <a:ln w="9525" cap="flat" cmpd="sng" algn="ctr">
+          <a:solidFill>
+            <a:schemeClr val="phClr">
+              <a:shade val="95000"/>
+              <a:satMod val="105000"/>
+            </a:schemeClr>
+          </a:solidFill>
+          <a:prstDash val="solid"/>
+        </a:ln>
+        <a:ln w="25400" cap="flat" cmpd="sng" algn="ctr">
+          <a:solidFill>
+            <a:schemeClr val="phClr"/>
+          </a:solidFill>
+          <a:prstDash val="solid"/>
+        </a:ln>
+        <a:ln w="38100" cap="flat" cmpd="sng" algn="ctr">
+          <a:solidFill>
+            <a:schemeClr val="phClr"/>
+          </a:solidFill>
+          <a:prstDash val="solid"/>
+        </a:ln>
+      </a:lnStyleLst>
+      <a:effectStyleLst>
+        <a:effectStyle>
+          <a:effectLst>
+            <a:outerShdw blurRad="40000" dist="20000" dir="5400000" rotWithShape="0">
+              <a:srgbClr val="000000">
+                <a:alpha val="38000"/>
+              </a:srgbClr>
+            </a:outerShdw>
+          </a:effectLst>
+        </a:effectStyle>
+        <a:effectStyle>
+          <a:effectLst>
+            <a:outerShdw blurRad="40000" dist="23000" dir="5400000" rotWithShape="0">
+              <a:srgbClr val="000000">
+                <a:alpha val="35000"/>
+              </a:srgbClr>
+            </a:outerShdw>
+          </a:effectLst>
+        </a:effectStyle>
+        <a:effectStyle>
+          <a:effectLst>
+            <a:outerShdw blurRad="40000" dist="23000" dir="5400000" rotWithShape="0">
+              <a:srgbClr val="000000">
+                <a:alpha val="35000"/>
+              </a:srgbClr>
+            </a:outerShdw>
+          </a:effectLst>
+          <a:scene3d>
+            <a:camera prst="orthographicFront">
+              <a:rot lat="0" lon="0" rev="0"/>
+            </a:camera>
+            <a:lightRig rig="threePt" dir="t">
+              <a:rot lat="0" lon="0" rev="1200000"/>
+            </a:lightRig>
+          </a:scene3d>
+          <a:sp3d>
+            <a:bevelT w="63500" h="25400"/>
+          </a:sp3d>
+        </a:effectStyle>
+      </a:effectStyleLst>
+      <a:bgFillStyleLst>
+        <a:solidFill>
+          <a:schemeClr val="phClr"/>
+        </a:solidFill>
+        <a:gradFill rotWithShape="1">
+          <a:gsLst>
+            <a:gs pos="0">
+              <a:schemeClr val="phClr">
+                <a:tint val="40000"/>
+                <a:satMod val="350000"/>
+              </a:schemeClr>
+            </a:gs>
+            <a:gs pos="40000">
+              <a:schemeClr val="phClr">
+                <a:tint val="45000"/>
+                <a:shade val="99000"/>
+                <a:satMod val="350000"/>
+              </a:schemeClr>
+            </a:gs>
+            <a:gs pos="100000">
+              <a:schemeClr val="phClr">
+                <a:shade val="20000"/>
+                <a:satMod val="255000"/>
+              </a:schemeClr>
+            </a:gs>
+          </a:gsLst>
+          <a:path path="circle">
+            <a:fillToRect l="50000" t="-80000" r="50000" b="180000"/>
+          </a:path>
+        </a:gradFill>
+        <a:gradFill rotWithShape="1">
+          <a:gsLst>
+            <a:gs pos="0">
+              <a:schemeClr val="phClr">
+                <a:tint val="80000"/>
+                <a:satMod val="300000"/>
+              </a:schemeClr>
+            </a:gs>
+            <a:gs pos="100000">
+              <a:schemeClr val="phClr">
+                <a:shade val="30000"/>
+                <a:satMod val="200000"/>
+              </a:schemeClr>
+            </a:gs>
+          </a:gsLst>
+          <a:path path="circle">
+            <a:fillToRect l="50000" t="50000" r="50000" b="50000"/>
+          </a:path>
+        </a:gradFill>
+      </a:bgFillStyleLst>
+    </a:fmtScheme>
+  </a:themeElements>
+</a:theme>
+</file>
+
+<file path=ppt/theme/theme2.xml><?xml version="1.0" encoding="utf-8"?>
 <a:theme xmlns:a="http://schemas.openxmlformats.org/drawingml/2006/main" xmlns:r="http://schemas.openxmlformats.org/officeDocument/2006/relationships">
   <a:themeElements>
     <a:clrScheme name="Default">
@@ -25731,283 +25551,4 @@
     </a:fmtScheme>
   </a:themeElements>
 </a:theme>
-</file>
-
-<file path=ppt/theme/theme2.xml><?xml version="1.0" encoding="utf-8"?>
-<a:theme xmlns:a="http://schemas.openxmlformats.org/drawingml/2006/main" xmlns:r="http://schemas.openxmlformats.org/officeDocument/2006/relationships" name="2_Personalizza struttura">
-  <a:themeElements>
-    <a:clrScheme name="2_Personalizza struttura 1">
-      <a:dk1>
-        <a:srgbClr val="000000"/>
-      </a:dk1>
-      <a:lt1>
-        <a:srgbClr val="FFFFFF"/>
-      </a:lt1>
-      <a:dk2>
-        <a:srgbClr val="000000"/>
-      </a:dk2>
-      <a:lt2>
-        <a:srgbClr val="808080"/>
-      </a:lt2>
-      <a:accent1>
-        <a:srgbClr val="BBE0E3"/>
-      </a:accent1>
-      <a:accent2>
-        <a:srgbClr val="333399"/>
-      </a:accent2>
-      <a:accent3>
-        <a:srgbClr val="FFFFFF"/>
-      </a:accent3>
-      <a:accent4>
-        <a:srgbClr val="000000"/>
-      </a:accent4>
-      <a:accent5>
-        <a:srgbClr val="DAEDEF"/>
-      </a:accent5>
-      <a:accent6>
-        <a:srgbClr val="2D2D8A"/>
-      </a:accent6>
-      <a:hlink>
-        <a:srgbClr val="009999"/>
-      </a:hlink>
-      <a:folHlink>
-        <a:srgbClr val="99CC00"/>
-      </a:folHlink>
-    </a:clrScheme>
-    <a:fontScheme name="Office">
-      <a:majorFont>
-        <a:latin typeface="Arial"/>
-        <a:ea typeface=""/>
-        <a:cs typeface=""/>
-        <a:font script="Jpan" typeface="ＭＳ Ｐゴシック"/>
-        <a:font script="Hang" typeface="맑은 고딕"/>
-        <a:font script="Hans" typeface="宋体"/>
-        <a:font script="Hant" typeface="新細明體"/>
-        <a:font script="Arab" typeface="Times New Roman"/>
-        <a:font script="Hebr" typeface="Times New Roman"/>
-        <a:font script="Thai" typeface="Angsana New"/>
-        <a:font script="Ethi" typeface="Nyala"/>
-        <a:font script="Beng" typeface="Vrinda"/>
-        <a:font script="Gujr" typeface="Shruti"/>
-        <a:font script="Khmr" typeface="MoolBoran"/>
-        <a:font script="Knda" typeface="Tunga"/>
-        <a:font script="Guru" typeface="Raavi"/>
-        <a:font script="Cans" typeface="Euphemia"/>
-        <a:font script="Cher" typeface="Plantagenet Cherokee"/>
-        <a:font script="Yiii" typeface="Microsoft Yi Baiti"/>
-        <a:font script="Tibt" typeface="Microsoft Himalaya"/>
-        <a:font script="Thaa" typeface="MV Boli"/>
-        <a:font script="Deva" typeface="Mangal"/>
-        <a:font script="Telu" typeface="Gautami"/>
-        <a:font script="Taml" typeface="Latha"/>
-        <a:font script="Syrc" typeface="Estrangelo Edessa"/>
-        <a:font script="Orya" typeface="Kalinga"/>
-        <a:font script="Mlym" typeface="Kartika"/>
-        <a:font script="Laoo" typeface="DokChampa"/>
-        <a:font script="Sinh" typeface="Iskoola Pota"/>
-        <a:font script="Mong" typeface="Mongolian Baiti"/>
-        <a:font script="Viet" typeface="Times New Roman"/>
-        <a:font script="Uigh" typeface="Microsoft Uighur"/>
-        <a:font script="Geor" typeface="Sylfaen"/>
-      </a:majorFont>
-      <a:minorFont>
-        <a:latin typeface="Arial"/>
-        <a:ea typeface=""/>
-        <a:cs typeface=""/>
-        <a:font script="Jpan" typeface="ＭＳ Ｐゴシック"/>
-        <a:font script="Hang" typeface="맑은 고딕"/>
-        <a:font script="Hans" typeface="宋体"/>
-        <a:font script="Hant" typeface="新細明體"/>
-        <a:font script="Arab" typeface="Arial"/>
-        <a:font script="Hebr" typeface="Arial"/>
-        <a:font script="Thai" typeface="Cordia New"/>
-        <a:font script="Ethi" typeface="Nyala"/>
-        <a:font script="Beng" typeface="Vrinda"/>
-        <a:font script="Gujr" typeface="Shruti"/>
-        <a:font script="Khmr" typeface="DaunPenh"/>
-        <a:font script="Knda" typeface="Tunga"/>
-        <a:font script="Guru" typeface="Raavi"/>
-        <a:font script="Cans" typeface="Euphemia"/>
-        <a:font script="Cher" typeface="Plantagenet Cherokee"/>
-        <a:font script="Yiii" typeface="Microsoft Yi Baiti"/>
-        <a:font script="Tibt" typeface="Microsoft Himalaya"/>
-        <a:font script="Thaa" typeface="MV Boli"/>
-        <a:font script="Deva" typeface="Mangal"/>
-        <a:font script="Telu" typeface="Gautami"/>
-        <a:font script="Taml" typeface="Latha"/>
-        <a:font script="Syrc" typeface="Estrangelo Edessa"/>
-        <a:font script="Orya" typeface="Kalinga"/>
-        <a:font script="Mlym" typeface="Kartika"/>
-        <a:font script="Laoo" typeface="DokChampa"/>
-        <a:font script="Sinh" typeface="Iskoola Pota"/>
-        <a:font script="Mong" typeface="Mongolian Baiti"/>
-        <a:font script="Viet" typeface="Arial"/>
-        <a:font script="Uigh" typeface="Microsoft Uighur"/>
-        <a:font script="Geor" typeface="Sylfaen"/>
-      </a:minorFont>
-    </a:fontScheme>
-    <a:fmtScheme name="Office">
-      <a:fillStyleLst>
-        <a:solidFill>
-          <a:schemeClr val="phClr"/>
-        </a:solidFill>
-        <a:gradFill rotWithShape="1">
-          <a:gsLst>
-            <a:gs pos="0">
-              <a:schemeClr val="phClr">
-                <a:tint val="50000"/>
-                <a:satMod val="300000"/>
-              </a:schemeClr>
-            </a:gs>
-            <a:gs pos="35000">
-              <a:schemeClr val="phClr">
-                <a:tint val="37000"/>
-                <a:satMod val="300000"/>
-              </a:schemeClr>
-            </a:gs>
-            <a:gs pos="100000">
-              <a:schemeClr val="phClr">
-                <a:tint val="15000"/>
-                <a:satMod val="350000"/>
-              </a:schemeClr>
-            </a:gs>
-          </a:gsLst>
-          <a:lin ang="16200000" scaled="1"/>
-        </a:gradFill>
-        <a:gradFill rotWithShape="1">
-          <a:gsLst>
-            <a:gs pos="0">
-              <a:schemeClr val="phClr">
-                <a:tint val="100000"/>
-                <a:shade val="100000"/>
-                <a:satMod val="130000"/>
-              </a:schemeClr>
-            </a:gs>
-            <a:gs pos="100000">
-              <a:schemeClr val="phClr">
-                <a:tint val="50000"/>
-                <a:shade val="100000"/>
-                <a:satMod val="350000"/>
-              </a:schemeClr>
-            </a:gs>
-          </a:gsLst>
-          <a:lin ang="16200000" scaled="0"/>
-        </a:gradFill>
-      </a:fillStyleLst>
-      <a:lnStyleLst>
-        <a:ln w="9525" cap="flat" cmpd="sng" algn="ctr">
-          <a:solidFill>
-            <a:schemeClr val="phClr">
-              <a:shade val="95000"/>
-              <a:satMod val="105000"/>
-            </a:schemeClr>
-          </a:solidFill>
-          <a:prstDash val="solid"/>
-        </a:ln>
-        <a:ln w="25400" cap="flat" cmpd="sng" algn="ctr">
-          <a:solidFill>
-            <a:schemeClr val="phClr"/>
-          </a:solidFill>
-          <a:prstDash val="solid"/>
-        </a:ln>
-        <a:ln w="38100" cap="flat" cmpd="sng" algn="ctr">
-          <a:solidFill>
-            <a:schemeClr val="phClr"/>
-          </a:solidFill>
-          <a:prstDash val="solid"/>
-        </a:ln>
-      </a:lnStyleLst>
-      <a:effectStyleLst>
-        <a:effectStyle>
-          <a:effectLst>
-            <a:outerShdw blurRad="40000" dist="20000" dir="5400000" rotWithShape="0">
-              <a:srgbClr val="000000">
-                <a:alpha val="38000"/>
-              </a:srgbClr>
-            </a:outerShdw>
-          </a:effectLst>
-        </a:effectStyle>
-        <a:effectStyle>
-          <a:effectLst>
-            <a:outerShdw blurRad="40000" dist="23000" dir="5400000" rotWithShape="0">
-              <a:srgbClr val="000000">
-                <a:alpha val="35000"/>
-              </a:srgbClr>
-            </a:outerShdw>
-          </a:effectLst>
-        </a:effectStyle>
-        <a:effectStyle>
-          <a:effectLst>
-            <a:outerShdw blurRad="40000" dist="23000" dir="5400000" rotWithShape="0">
-              <a:srgbClr val="000000">
-                <a:alpha val="35000"/>
-              </a:srgbClr>
-            </a:outerShdw>
-          </a:effectLst>
-          <a:scene3d>
-            <a:camera prst="orthographicFront">
-              <a:rot lat="0" lon="0" rev="0"/>
-            </a:camera>
-            <a:lightRig rig="threePt" dir="t">
-              <a:rot lat="0" lon="0" rev="1200000"/>
-            </a:lightRig>
-          </a:scene3d>
-          <a:sp3d>
-            <a:bevelT w="63500" h="25400"/>
-          </a:sp3d>
-        </a:effectStyle>
-      </a:effectStyleLst>
-      <a:bgFillStyleLst>
-        <a:solidFill>
-          <a:schemeClr val="phClr"/>
-        </a:solidFill>
-        <a:gradFill rotWithShape="1">
-          <a:gsLst>
-            <a:gs pos="0">
-              <a:schemeClr val="phClr">
-                <a:tint val="40000"/>
-                <a:satMod val="350000"/>
-              </a:schemeClr>
-            </a:gs>
-            <a:gs pos="40000">
-              <a:schemeClr val="phClr">
-                <a:tint val="45000"/>
-                <a:shade val="99000"/>
-                <a:satMod val="350000"/>
-              </a:schemeClr>
-            </a:gs>
-            <a:gs pos="100000">
-              <a:schemeClr val="phClr">
-                <a:shade val="20000"/>
-                <a:satMod val="255000"/>
-              </a:schemeClr>
-            </a:gs>
-          </a:gsLst>
-          <a:path path="circle">
-            <a:fillToRect l="50000" t="-80000" r="50000" b="180000"/>
-          </a:path>
-        </a:gradFill>
-        <a:gradFill rotWithShape="1">
-          <a:gsLst>
-            <a:gs pos="0">
-              <a:schemeClr val="phClr">
-                <a:tint val="80000"/>
-                <a:satMod val="300000"/>
-              </a:schemeClr>
-            </a:gs>
-            <a:gs pos="100000">
-              <a:schemeClr val="phClr">
-                <a:shade val="30000"/>
-                <a:satMod val="200000"/>
-              </a:schemeClr>
-            </a:gs>
-          </a:gsLst>
-          <a:path path="circle">
-            <a:fillToRect l="50000" t="50000" r="50000" b="50000"/>
-          </a:path>
-        </a:gradFill>
-      </a:bgFillStyleLst>
-    </a:fmtScheme>
-  </a:themeElements>
-</a:theme>
 </file>
</xml_diff>